<commit_message>
#8 Helpful extensions - finetuning.
</commit_message>
<xml_diff>
--- a/slides/Kotlin - 1. Helpful Extensions.pptx
+++ b/slides/Kotlin - 1. Helpful Extensions.pptx
@@ -5,7 +5,7 @@
     <p:sldMasterId id="2147483648" r:id="rId1"/>
   </p:sldMasterIdLst>
   <p:notesMasterIdLst>
-    <p:notesMasterId r:id="rId9"/>
+    <p:notesMasterId r:id="rId11"/>
   </p:notesMasterIdLst>
   <p:sldIdLst>
     <p:sldId id="311" r:id="rId2"/>
@@ -13,8 +13,10 @@
     <p:sldId id="362" r:id="rId4"/>
     <p:sldId id="361" r:id="rId5"/>
     <p:sldId id="363" r:id="rId6"/>
-    <p:sldId id="312" r:id="rId7"/>
-    <p:sldId id="298" r:id="rId8"/>
+    <p:sldId id="364" r:id="rId7"/>
+    <p:sldId id="365" r:id="rId8"/>
+    <p:sldId id="312" r:id="rId9"/>
+    <p:sldId id="298" r:id="rId10"/>
   </p:sldIdLst>
   <p:sldSz cx="9144000" cy="6858000" type="screen4x3"/>
   <p:notesSz cx="6858000" cy="9144000"/>
@@ -115,7 +117,7 @@
   </p:defaultTextStyle>
   <p:extLst>
     <p:ext uri="{EFAFB233-063F-42B5-8137-9DF3F51BA10A}">
-      <p15:sldGuideLst xmlns:p15="http://schemas.microsoft.com/office/powerpoint/2012/main" xmlns="">
+      <p15:sldGuideLst xmlns="" xmlns:p15="http://schemas.microsoft.com/office/powerpoint/2012/main">
         <p15:guide id="1" orient="horz" pos="2160">
           <p15:clr>
             <a:srgbClr val="A4A3A4"/>
@@ -129,7 +131,7 @@
       </p15:sldGuideLst>
     </p:ext>
     <p:ext uri="{2D200454-40CA-4A62-9FC3-DE9A4176ACB9}">
-      <p15:notesGuideLst xmlns:p15="http://schemas.microsoft.com/office/powerpoint/2012/main" xmlns="">
+      <p15:notesGuideLst xmlns="" xmlns:p15="http://schemas.microsoft.com/office/powerpoint/2012/main">
         <p15:guide id="1" orient="horz" pos="2880">
           <p15:clr>
             <a:srgbClr val="A4A3A4"/>
@@ -237,7 +239,7 @@
             <a:fld id="{B7CEC25C-B4E9-458D-8E4B-2C06A129DA19}" type="datetimeFigureOut">
               <a:rPr lang="cs-CZ" smtClean="0"/>
               <a:pPr/>
-              <a:t>19.02.2019</a:t>
+              <a:t>20.02.2019</a:t>
             </a:fld>
             <a:endParaRPr lang="cs-CZ"/>
           </a:p>
@@ -926,113 +928,6 @@
               <a:rPr lang="en-US" baseline="0" dirty="0" smtClean="0"/>
               <a:t>.</a:t>
             </a:r>
-          </a:p>
-          <a:p>
-            <a:r>
-              <a:rPr lang="cs-CZ" baseline="0" dirty="0" smtClean="0"/>
-              <a:t>u</a:t>
-            </a:r>
-            <a:r>
-              <a:rPr lang="en-US" baseline="0" dirty="0" smtClean="0"/>
-              <a:t>se</a:t>
-            </a:r>
-            <a:endParaRPr lang="cs-CZ" baseline="0" dirty="0" smtClean="0"/>
-          </a:p>
-          <a:p>
-            <a:r>
-              <a:rPr lang="cs-CZ" baseline="0" dirty="0" smtClean="0"/>
-              <a:t>  </a:t>
-            </a:r>
-            <a:r>
-              <a:rPr lang="en-US" baseline="0" dirty="0" smtClean="0"/>
-              <a:t>– je </a:t>
-            </a:r>
-            <a:r>
-              <a:rPr lang="en-US" baseline="0" dirty="0" err="1" smtClean="0"/>
-              <a:t>generick</a:t>
-            </a:r>
-            <a:r>
-              <a:rPr lang="cs-CZ" baseline="0" dirty="0" smtClean="0"/>
-              <a:t>á </a:t>
-            </a:r>
-            <a:r>
-              <a:rPr lang="cs-CZ" baseline="0" dirty="0" err="1" smtClean="0"/>
-              <a:t>extension</a:t>
-            </a:r>
-            <a:r>
-              <a:rPr lang="cs-CZ" baseline="0" dirty="0" smtClean="0"/>
-              <a:t> metoda z kotlin.io – lze použít na jakéhokoli potomka </a:t>
-            </a:r>
-            <a:r>
-              <a:rPr lang="cs-CZ" baseline="0" dirty="0" err="1" smtClean="0"/>
-              <a:t>Closeable</a:t>
-            </a:r>
-            <a:r>
-              <a:rPr lang="cs-CZ" baseline="0" dirty="0" smtClean="0"/>
-              <a:t>? – zajistí zavření </a:t>
-            </a:r>
-            <a:r>
-              <a:rPr lang="cs-CZ" baseline="0" dirty="0" err="1" smtClean="0"/>
-              <a:t>streamu</a:t>
-            </a:r>
-            <a:r>
-              <a:rPr lang="cs-CZ" baseline="0" dirty="0" smtClean="0"/>
-              <a:t> i v případě výjimky</a:t>
-            </a:r>
-          </a:p>
-          <a:p>
-            <a:r>
-              <a:rPr lang="cs-CZ" baseline="0" dirty="0" smtClean="0"/>
-              <a:t>  - </a:t>
-            </a:r>
-            <a:r>
-              <a:rPr lang="cs-CZ" baseline="0" dirty="0" err="1" smtClean="0"/>
-              <a:t>koltin</a:t>
-            </a:r>
-            <a:r>
-              <a:rPr lang="cs-CZ" baseline="0" dirty="0" smtClean="0"/>
-              <a:t> funkce jako </a:t>
-            </a:r>
-            <a:r>
-              <a:rPr lang="cs-CZ" baseline="0" dirty="0" err="1" smtClean="0"/>
-              <a:t>writeText</a:t>
-            </a:r>
-            <a:r>
-              <a:rPr lang="cs-CZ" baseline="0" dirty="0" smtClean="0"/>
-              <a:t>, </a:t>
-            </a:r>
-            <a:r>
-              <a:rPr lang="cs-CZ" baseline="0" dirty="0" err="1" smtClean="0"/>
-              <a:t>writeByte</a:t>
-            </a:r>
-            <a:r>
-              <a:rPr lang="cs-CZ" baseline="0" dirty="0" smtClean="0"/>
-              <a:t>,</a:t>
-            </a:r>
-            <a:r>
-              <a:rPr lang="en-US" baseline="0" dirty="0" smtClean="0"/>
-              <a:t> </a:t>
-            </a:r>
-            <a:r>
-              <a:rPr lang="en-US" baseline="0" dirty="0" err="1" smtClean="0"/>
-              <a:t>readLines</a:t>
-            </a:r>
-            <a:r>
-              <a:rPr lang="en-US" baseline="0" dirty="0" smtClean="0"/>
-              <a:t> </a:t>
-            </a:r>
-            <a:r>
-              <a:rPr lang="en-US" baseline="0" dirty="0" err="1" smtClean="0"/>
-              <a:t>atd</a:t>
-            </a:r>
-            <a:r>
-              <a:rPr lang="en-US" baseline="0" dirty="0" smtClean="0"/>
-              <a:t>. – j</a:t>
-            </a:r>
-            <a:r>
-              <a:rPr lang="cs-CZ" baseline="0" dirty="0" smtClean="0"/>
-              <a:t>í také používají</a:t>
-            </a:r>
             <a:endParaRPr lang="en-US" baseline="0" dirty="0" smtClean="0"/>
           </a:p>
         </p:txBody>
@@ -1065,6 +960,199 @@
     <p:extLst>
       <p:ext uri="{BB962C8B-B14F-4D97-AF65-F5344CB8AC3E}">
         <p14:creationId xmlns:p14="http://schemas.microsoft.com/office/powerpoint/2010/main" val="379663094"/>
+      </p:ext>
+    </p:extLst>
+  </p:cSld>
+  <p:clrMapOvr>
+    <a:masterClrMapping/>
+  </p:clrMapOvr>
+</p:notes>
+</file>
+
+<file path=ppt/notesSlides/notesSlide5.xml><?xml version="1.0" encoding="utf-8"?>
+<p:notes xmlns:a="http://schemas.openxmlformats.org/drawingml/2006/main" xmlns:r="http://schemas.openxmlformats.org/officeDocument/2006/relationships" xmlns:p="http://schemas.openxmlformats.org/presentationml/2006/main">
+  <p:cSld>
+    <p:spTree>
+      <p:nvGrpSpPr>
+        <p:cNvPr id="1" name=""/>
+        <p:cNvGrpSpPr/>
+        <p:nvPr/>
+      </p:nvGrpSpPr>
+      <p:grpSpPr>
+        <a:xfrm>
+          <a:off x="0" y="0"/>
+          <a:ext cx="0" cy="0"/>
+          <a:chOff x="0" y="0"/>
+          <a:chExt cx="0" cy="0"/>
+        </a:xfrm>
+      </p:grpSpPr>
+      <p:sp>
+        <p:nvSpPr>
+          <p:cNvPr id="2" name="Zástupný symbol pro obrázek snímku 1"/>
+          <p:cNvSpPr>
+            <a:spLocks noGrp="1" noRot="1" noChangeAspect="1"/>
+          </p:cNvSpPr>
+          <p:nvPr>
+            <p:ph type="sldImg"/>
+          </p:nvPr>
+        </p:nvSpPr>
+        <p:spPr/>
+      </p:sp>
+      <p:sp>
+        <p:nvSpPr>
+          <p:cNvPr id="3" name="Zástupný symbol pro poznámky 2"/>
+          <p:cNvSpPr>
+            <a:spLocks noGrp="1"/>
+          </p:cNvSpPr>
+          <p:nvPr>
+            <p:ph type="body" idx="1"/>
+          </p:nvPr>
+        </p:nvSpPr>
+        <p:spPr/>
+        <p:txBody>
+          <a:bodyPr/>
+          <a:lstStyle/>
+          <a:p>
+            <a:r>
+              <a:rPr lang="cs-CZ" baseline="0" dirty="0" smtClean="0"/>
+              <a:t>u</a:t>
+            </a:r>
+            <a:r>
+              <a:rPr lang="en-US" baseline="0" dirty="0" smtClean="0"/>
+              <a:t>se</a:t>
+            </a:r>
+            <a:endParaRPr lang="cs-CZ" baseline="0" dirty="0" smtClean="0"/>
+          </a:p>
+          <a:p>
+            <a:r>
+              <a:rPr lang="cs-CZ" baseline="0" dirty="0" smtClean="0"/>
+              <a:t>  </a:t>
+            </a:r>
+            <a:r>
+              <a:rPr lang="en-US" baseline="0" dirty="0" smtClean="0"/>
+              <a:t>– je </a:t>
+            </a:r>
+            <a:r>
+              <a:rPr lang="en-US" baseline="0" dirty="0" err="1" smtClean="0"/>
+              <a:t>generick</a:t>
+            </a:r>
+            <a:r>
+              <a:rPr lang="cs-CZ" baseline="0" dirty="0" smtClean="0"/>
+              <a:t>á </a:t>
+            </a:r>
+            <a:r>
+              <a:rPr lang="cs-CZ" baseline="0" dirty="0" err="1" smtClean="0"/>
+              <a:t>extension</a:t>
+            </a:r>
+            <a:r>
+              <a:rPr lang="cs-CZ" baseline="0" dirty="0" smtClean="0"/>
+              <a:t> metoda z kotlin.io – lze použít na jakéhokoli potomka </a:t>
+            </a:r>
+            <a:r>
+              <a:rPr lang="cs-CZ" baseline="0" dirty="0" err="1" smtClean="0"/>
+              <a:t>Closeable</a:t>
+            </a:r>
+            <a:r>
+              <a:rPr lang="cs-CZ" baseline="0" dirty="0" smtClean="0"/>
+              <a:t>? – zajistí zavření </a:t>
+            </a:r>
+            <a:r>
+              <a:rPr lang="cs-CZ" baseline="0" dirty="0" err="1" smtClean="0"/>
+              <a:t>streamu</a:t>
+            </a:r>
+            <a:r>
+              <a:rPr lang="cs-CZ" baseline="0" dirty="0" smtClean="0"/>
+              <a:t> i v případě výjimky</a:t>
+            </a:r>
+          </a:p>
+          <a:p>
+            <a:r>
+              <a:rPr lang="cs-CZ" baseline="0" dirty="0" smtClean="0"/>
+              <a:t>  - </a:t>
+            </a:r>
+            <a:r>
+              <a:rPr lang="cs-CZ" baseline="0" dirty="0" err="1" smtClean="0"/>
+              <a:t>koltin</a:t>
+            </a:r>
+            <a:r>
+              <a:rPr lang="cs-CZ" baseline="0" dirty="0" smtClean="0"/>
+              <a:t> funkce jako </a:t>
+            </a:r>
+            <a:r>
+              <a:rPr lang="cs-CZ" baseline="0" dirty="0" err="1" smtClean="0"/>
+              <a:t>writeText</a:t>
+            </a:r>
+            <a:r>
+              <a:rPr lang="cs-CZ" baseline="0" dirty="0" smtClean="0"/>
+              <a:t>, </a:t>
+            </a:r>
+            <a:r>
+              <a:rPr lang="cs-CZ" baseline="0" dirty="0" err="1" smtClean="0"/>
+              <a:t>writeByte</a:t>
+            </a:r>
+            <a:r>
+              <a:rPr lang="cs-CZ" baseline="0" dirty="0" smtClean="0"/>
+              <a:t>,</a:t>
+            </a:r>
+            <a:r>
+              <a:rPr lang="en-US" baseline="0" dirty="0" smtClean="0"/>
+              <a:t> </a:t>
+            </a:r>
+            <a:r>
+              <a:rPr lang="en-US" baseline="0" dirty="0" err="1" smtClean="0"/>
+              <a:t>readLines</a:t>
+            </a:r>
+            <a:r>
+              <a:rPr lang="en-US" baseline="0" dirty="0" smtClean="0"/>
+              <a:t> </a:t>
+            </a:r>
+            <a:r>
+              <a:rPr lang="en-US" baseline="0" dirty="0" err="1" smtClean="0"/>
+              <a:t>atd</a:t>
+            </a:r>
+            <a:r>
+              <a:rPr lang="en-US" baseline="0" dirty="0" smtClean="0"/>
+              <a:t>. – j</a:t>
+            </a:r>
+            <a:r>
+              <a:rPr lang="cs-CZ" baseline="0" dirty="0" smtClean="0"/>
+              <a:t>í také používají</a:t>
+            </a:r>
+            <a:endParaRPr lang="en-US" baseline="0" dirty="0" smtClean="0"/>
+          </a:p>
+          <a:p>
+            <a:endParaRPr lang="cs-CZ" dirty="0"/>
+          </a:p>
+        </p:txBody>
+      </p:sp>
+      <p:sp>
+        <p:nvSpPr>
+          <p:cNvPr id="4" name="Zástupný symbol pro číslo snímku 3"/>
+          <p:cNvSpPr>
+            <a:spLocks noGrp="1"/>
+          </p:cNvSpPr>
+          <p:nvPr>
+            <p:ph type="sldNum" sz="quarter" idx="10"/>
+          </p:nvPr>
+        </p:nvSpPr>
+        <p:spPr/>
+        <p:txBody>
+          <a:bodyPr/>
+          <a:lstStyle/>
+          <a:p>
+            <a:fld id="{27886F17-B5D0-472B-8745-C3F2BDEA3FAA}" type="slidenum">
+              <a:rPr lang="cs-CZ" smtClean="0"/>
+              <a:pPr/>
+              <a:t>6</a:t>
+            </a:fld>
+            <a:endParaRPr lang="cs-CZ"/>
+          </a:p>
+        </p:txBody>
+      </p:sp>
+    </p:spTree>
+    <p:extLst>
+      <p:ext uri="{BB962C8B-B14F-4D97-AF65-F5344CB8AC3E}">
+        <p14:creationId xmlns:p14="http://schemas.microsoft.com/office/powerpoint/2010/main" val="3653684627"/>
       </p:ext>
     </p:extLst>
   </p:cSld>
@@ -9063,29 +9151,16 @@
             </a:r>
             <a:r>
               <a:rPr lang="cs-CZ" dirty="0" smtClean="0"/>
-              <a:t> funkce pro měření času</a:t>
-            </a:r>
-          </a:p>
-          <a:p>
-            <a:pPr lvl="2"/>
+              <a:t> funkce pro měření </a:t>
+            </a:r>
+            <a:r>
+              <a:rPr lang="cs-CZ" dirty="0" smtClean="0"/>
+              <a:t>času z </a:t>
+            </a:r>
             <a:r>
               <a:rPr lang="cs-CZ" dirty="0" err="1" smtClean="0"/>
-              <a:t>measureNanoTime</a:t>
-            </a:r>
-            <a:endParaRPr lang="cs-CZ" dirty="0" smtClean="0"/>
-          </a:p>
-          <a:p>
-            <a:pPr lvl="2"/>
-            <a:r>
-              <a:rPr lang="cs-CZ" dirty="0" err="1" smtClean="0"/>
-              <a:t>measureTimeMillis</a:t>
-            </a:r>
-            <a:endParaRPr lang="cs-CZ" dirty="0"/>
-          </a:p>
-          <a:p>
-            <a:pPr marL="635400" lvl="2" indent="0">
-              <a:buNone/>
-            </a:pPr>
+              <a:t>Timing.kt</a:t>
+            </a:r>
             <a:endParaRPr lang="cs-CZ" dirty="0" smtClean="0"/>
           </a:p>
           <a:p>
@@ -9104,6 +9179,13 @@
   <p:clrMapOvr>
     <a:masterClrMapping/>
   </p:clrMapOvr>
+  <p:timing>
+    <p:tnLst>
+      <p:par>
+        <p:cTn id="1" dur="indefinite" restart="never" nodeType="tmRoot"/>
+      </p:par>
+    </p:tnLst>
+  </p:timing>
 </p:sld>
 </file>
 
@@ -9680,38 +9762,10 @@
             </a:r>
             <a:r>
               <a:rPr lang="en-US" dirty="0" smtClean="0"/>
-              <a:t>() {}</a:t>
-            </a:r>
-            <a:endParaRPr lang="cs-CZ" dirty="0" smtClean="0"/>
-          </a:p>
-          <a:p>
-            <a:pPr marL="342900" lvl="1" indent="-342900">
-              <a:spcBef>
-                <a:spcPts val="600"/>
-              </a:spcBef>
-              <a:spcAft>
-                <a:spcPts val="400"/>
-              </a:spcAft>
-              <a:buClr>
-                <a:schemeClr val="tx2"/>
-              </a:buClr>
-              <a:buFont typeface="Arial" pitchFamily="34" charset="0"/>
-              <a:buChar char="›"/>
-            </a:pPr>
-            <a:r>
-              <a:rPr lang="cs-CZ" sz="2800" b="1" dirty="0" smtClean="0"/>
-              <a:t>.</a:t>
-            </a:r>
-            <a:r>
-              <a:rPr lang="en-US" sz="2800" b="1" dirty="0" smtClean="0"/>
-              <a:t>use</a:t>
-            </a:r>
-            <a:r>
-              <a:rPr lang="en-US" sz="2800" dirty="0" smtClean="0"/>
-              <a:t> </a:t>
-            </a:r>
-            <a:r>
-              <a:rPr lang="en-US" sz="2800" b="1" dirty="0" smtClean="0"/>
+              <a:t>() </a:t>
+            </a:r>
+            <a:r>
+              <a:rPr lang="en-US" dirty="0" smtClean="0"/>
               <a:t>{}</a:t>
             </a:r>
             <a:endParaRPr lang="cs-CZ" sz="2800" b="1" dirty="0" smtClean="0"/>
@@ -9749,10 +9803,15 @@
               <a:rPr lang="en-US" dirty="0" err="1" smtClean="0"/>
               <a:t>copyRecursively</a:t>
             </a:r>
-            <a:r>
-              <a:rPr lang="en-US" dirty="0" smtClean="0"/>
-              <a:t>, delete</a:t>
-            </a:r>
+            <a:endParaRPr lang="cs-CZ" dirty="0"/>
+          </a:p>
+          <a:p>
+            <a:pPr lvl="1"/>
+            <a:r>
+              <a:rPr lang="cs-CZ" dirty="0" err="1" smtClean="0"/>
+              <a:t>deleteRecursively</a:t>
+            </a:r>
+            <a:endParaRPr lang="en-US" dirty="0" smtClean="0"/>
           </a:p>
           <a:p>
             <a:pPr lvl="1"/>
@@ -9809,10 +9868,1272 @@
   <p:clrMapOvr>
     <a:masterClrMapping/>
   </p:clrMapOvr>
+  <p:timing>
+    <p:tnLst>
+      <p:par>
+        <p:cTn id="1" dur="indefinite" restart="never" nodeType="tmRoot"/>
+      </p:par>
+    </p:tnLst>
+  </p:timing>
 </p:sld>
 </file>
 
 <file path=ppt/slides/slide6.xml><?xml version="1.0" encoding="utf-8"?>
+<p:sld xmlns:a="http://schemas.openxmlformats.org/drawingml/2006/main" xmlns:r="http://schemas.openxmlformats.org/officeDocument/2006/relationships" xmlns:p="http://schemas.openxmlformats.org/presentationml/2006/main">
+  <p:cSld>
+    <p:spTree>
+      <p:nvGrpSpPr>
+        <p:cNvPr id="1" name=""/>
+        <p:cNvGrpSpPr/>
+        <p:nvPr/>
+      </p:nvGrpSpPr>
+      <p:grpSpPr>
+        <a:xfrm>
+          <a:off x="0" y="0"/>
+          <a:ext cx="0" cy="0"/>
+          <a:chOff x="0" y="0"/>
+          <a:chExt cx="0" cy="0"/>
+        </a:xfrm>
+      </p:grpSpPr>
+      <p:sp>
+        <p:nvSpPr>
+          <p:cNvPr id="2" name="Nadpis 1"/>
+          <p:cNvSpPr>
+            <a:spLocks noGrp="1"/>
+          </p:cNvSpPr>
+          <p:nvPr>
+            <p:ph type="title"/>
+          </p:nvPr>
+        </p:nvSpPr>
+        <p:spPr/>
+        <p:txBody>
+          <a:bodyPr/>
+          <a:lstStyle/>
+          <a:p>
+            <a:r>
+              <a:rPr lang="en-US" dirty="0" smtClean="0"/>
+              <a:t>Closeable - use</a:t>
+            </a:r>
+            <a:endParaRPr lang="cs-CZ" dirty="0"/>
+          </a:p>
+        </p:txBody>
+      </p:sp>
+      <p:sp>
+        <p:nvSpPr>
+          <p:cNvPr id="3" name="Zástupný symbol pro text 2"/>
+          <p:cNvSpPr>
+            <a:spLocks noGrp="1"/>
+          </p:cNvSpPr>
+          <p:nvPr>
+            <p:ph type="body" sz="quarter" idx="13"/>
+          </p:nvPr>
+        </p:nvSpPr>
+        <p:spPr>
+          <a:xfrm>
+            <a:off x="323528" y="1322183"/>
+            <a:ext cx="7848872" cy="1728193"/>
+          </a:xfrm>
+        </p:spPr>
+        <p:txBody>
+          <a:bodyPr/>
+          <a:lstStyle/>
+          <a:p>
+            <a:r>
+              <a:rPr lang="en-US" b="1" dirty="0" smtClean="0"/>
+              <a:t>.use</a:t>
+            </a:r>
+            <a:r>
+              <a:rPr lang="cs-CZ" b="1" dirty="0" smtClean="0"/>
+              <a:t> </a:t>
+            </a:r>
+            <a:r>
+              <a:rPr lang="en-US" b="1" dirty="0" smtClean="0"/>
+              <a:t>{}</a:t>
+            </a:r>
+          </a:p>
+          <a:p>
+            <a:pPr lvl="1"/>
+            <a:r>
+              <a:rPr lang="en-US" dirty="0" err="1" smtClean="0"/>
+              <a:t>generick</a:t>
+            </a:r>
+            <a:r>
+              <a:rPr lang="cs-CZ" dirty="0"/>
+              <a:t>á </a:t>
+            </a:r>
+            <a:r>
+              <a:rPr lang="cs-CZ" dirty="0" err="1"/>
+              <a:t>extension</a:t>
+            </a:r>
+            <a:r>
+              <a:rPr lang="cs-CZ" dirty="0"/>
+              <a:t> metoda z </a:t>
+            </a:r>
+            <a:r>
+              <a:rPr lang="cs-CZ" dirty="0" smtClean="0"/>
+              <a:t>kotlin.io</a:t>
+            </a:r>
+            <a:endParaRPr lang="en-US" dirty="0" smtClean="0"/>
+          </a:p>
+          <a:p>
+            <a:pPr lvl="1"/>
+            <a:r>
+              <a:rPr lang="cs-CZ" dirty="0" smtClean="0"/>
+              <a:t>lze </a:t>
+            </a:r>
+            <a:r>
+              <a:rPr lang="cs-CZ" dirty="0"/>
+              <a:t>použít na jakéhokoli potomka </a:t>
+            </a:r>
+            <a:r>
+              <a:rPr lang="cs-CZ" dirty="0" err="1" smtClean="0"/>
+              <a:t>Closeable</a:t>
+            </a:r>
+            <a:r>
+              <a:rPr lang="cs-CZ" dirty="0" smtClean="0"/>
+              <a:t>?</a:t>
+            </a:r>
+            <a:endParaRPr lang="en-US" dirty="0" smtClean="0"/>
+          </a:p>
+          <a:p>
+            <a:pPr lvl="1"/>
+            <a:r>
+              <a:rPr lang="cs-CZ" dirty="0" smtClean="0"/>
+              <a:t>zajistí </a:t>
+            </a:r>
+            <a:r>
+              <a:rPr lang="cs-CZ" dirty="0"/>
+              <a:t>zavření </a:t>
+            </a:r>
+            <a:r>
+              <a:rPr lang="cs-CZ" dirty="0" err="1"/>
+              <a:t>streamu</a:t>
+            </a:r>
+            <a:r>
+              <a:rPr lang="cs-CZ" dirty="0"/>
+              <a:t> i v případě </a:t>
+            </a:r>
+            <a:r>
+              <a:rPr lang="cs-CZ" dirty="0" smtClean="0"/>
+              <a:t>výjimky</a:t>
+            </a:r>
+            <a:endParaRPr lang="en-US" dirty="0" smtClean="0"/>
+          </a:p>
+          <a:p>
+            <a:pPr lvl="1"/>
+            <a:r>
+              <a:rPr lang="cs-CZ" dirty="0" err="1" smtClean="0"/>
+              <a:t>koltin</a:t>
+            </a:r>
+            <a:r>
+              <a:rPr lang="cs-CZ" dirty="0" smtClean="0"/>
+              <a:t> </a:t>
+            </a:r>
+            <a:r>
+              <a:rPr lang="cs-CZ" dirty="0"/>
+              <a:t>funkce jako </a:t>
+            </a:r>
+            <a:r>
+              <a:rPr lang="cs-CZ" dirty="0" err="1"/>
+              <a:t>writeText</a:t>
+            </a:r>
+            <a:r>
+              <a:rPr lang="cs-CZ" dirty="0"/>
+              <a:t>, </a:t>
+            </a:r>
+            <a:r>
+              <a:rPr lang="cs-CZ" dirty="0" err="1"/>
+              <a:t>writeByte</a:t>
+            </a:r>
+            <a:r>
+              <a:rPr lang="cs-CZ" dirty="0"/>
+              <a:t>,</a:t>
+            </a:r>
+            <a:r>
+              <a:rPr lang="en-US" dirty="0"/>
+              <a:t> </a:t>
+            </a:r>
+            <a:r>
+              <a:rPr lang="en-US" dirty="0" err="1"/>
+              <a:t>readLines</a:t>
+            </a:r>
+            <a:r>
+              <a:rPr lang="en-US" dirty="0"/>
+              <a:t> </a:t>
+            </a:r>
+            <a:r>
+              <a:rPr lang="en-US" dirty="0" err="1" smtClean="0"/>
+              <a:t>atd</a:t>
+            </a:r>
+            <a:r>
+              <a:rPr lang="en-US" dirty="0" smtClean="0"/>
+              <a:t>. j</a:t>
+            </a:r>
+            <a:r>
+              <a:rPr lang="cs-CZ" dirty="0"/>
+              <a:t>í </a:t>
+            </a:r>
+            <a:r>
+              <a:rPr lang="cs-CZ" dirty="0" smtClean="0"/>
+              <a:t>také</a:t>
+            </a:r>
+            <a:r>
+              <a:rPr lang="en-US" dirty="0" smtClean="0"/>
+              <a:t> intern</a:t>
+            </a:r>
+            <a:r>
+              <a:rPr lang="cs-CZ" dirty="0" smtClean="0"/>
+              <a:t>ě používají</a:t>
+            </a:r>
+            <a:endParaRPr lang="en-US" dirty="0"/>
+          </a:p>
+          <a:p>
+            <a:pPr lvl="1"/>
+            <a:endParaRPr lang="cs-CZ" b="1" dirty="0"/>
+          </a:p>
+        </p:txBody>
+      </p:sp>
+      <p:sp>
+        <p:nvSpPr>
+          <p:cNvPr id="4" name="Rectangle 1"/>
+          <p:cNvSpPr>
+            <a:spLocks noChangeArrowheads="1"/>
+          </p:cNvSpPr>
+          <p:nvPr/>
+        </p:nvSpPr>
+        <p:spPr bwMode="auto">
+          <a:xfrm>
+            <a:off x="755576" y="3645024"/>
+            <a:ext cx="7056784" cy="1477328"/>
+          </a:xfrm>
+          <a:prstGeom prst="rect">
+            <a:avLst/>
+          </a:prstGeom>
+          <a:solidFill>
+            <a:srgbClr val="FFFFFF"/>
+          </a:solidFill>
+          <a:ln>
+            <a:noFill/>
+          </a:ln>
+          <a:effectLst/>
+          <a:extLst>
+            <a:ext uri="{91240B29-F687-4F45-9708-019B960494DF}">
+              <a14:hiddenLine xmlns:a14="http://schemas.microsoft.com/office/drawing/2010/main" w="9525">
+                <a:solidFill>
+                  <a:schemeClr val="tx1"/>
+                </a:solidFill>
+                <a:miter lim="800000"/>
+                <a:headEnd/>
+                <a:tailEnd/>
+              </a14:hiddenLine>
+            </a:ext>
+            <a:ext uri="{AF507438-7753-43E0-B8FC-AC1667EBCBE1}">
+              <a14:hiddenEffects xmlns:a14="http://schemas.microsoft.com/office/drawing/2010/main">
+                <a:effectLst>
+                  <a:outerShdw dist="35921" dir="2700000" algn="ctr" rotWithShape="0">
+                    <a:schemeClr val="bg2"/>
+                  </a:outerShdw>
+                </a:effectLst>
+              </a14:hiddenEffects>
+            </a:ext>
+          </a:extLst>
+        </p:spPr>
+        <p:txBody>
+          <a:bodyPr vert="horz" wrap="square" lIns="91440" tIns="45720" rIns="91440" bIns="45720" numCol="1" anchor="ctr" anchorCtr="0" compatLnSpc="1">
+            <a:prstTxWarp prst="textNoShape">
+              <a:avLst/>
+            </a:prstTxWarp>
+            <a:spAutoFit/>
+          </a:bodyPr>
+          <a:lstStyle/>
+          <a:p>
+            <a:pPr marL="0" marR="0" lvl="0" indent="0" algn="l" defTabSz="914400" rtl="0" eaLnBrk="1" fontAlgn="base" latinLnBrk="0" hangingPunct="1">
+              <a:lnSpc>
+                <a:spcPct val="100000"/>
+              </a:lnSpc>
+              <a:spcBef>
+                <a:spcPct val="0"/>
+              </a:spcBef>
+              <a:spcAft>
+                <a:spcPct val="0"/>
+              </a:spcAft>
+              <a:buClrTx/>
+              <a:buSzTx/>
+              <a:buFontTx/>
+              <a:buNone/>
+              <a:tabLst/>
+            </a:pPr>
+            <a:r>
+              <a:rPr kumimoji="0" lang="cs-CZ" altLang="cs-CZ" b="0" i="0" u="none" strike="noStrike" cap="none" normalizeH="0" baseline="0" dirty="0" err="1" smtClean="0">
+                <a:ln>
+                  <a:noFill/>
+                </a:ln>
+                <a:solidFill>
+                  <a:srgbClr val="000000"/>
+                </a:solidFill>
+                <a:effectLst/>
+                <a:latin typeface="Courier New" pitchFamily="49" charset="0"/>
+                <a:cs typeface="Courier New" pitchFamily="49" charset="0"/>
+              </a:rPr>
+              <a:t>File</a:t>
+            </a:r>
+            <a:r>
+              <a:rPr kumimoji="0" lang="cs-CZ" altLang="cs-CZ" b="0" i="0" u="none" strike="noStrike" cap="none" normalizeH="0" baseline="0" dirty="0" smtClean="0">
+                <a:ln>
+                  <a:noFill/>
+                </a:ln>
+                <a:solidFill>
+                  <a:srgbClr val="000000"/>
+                </a:solidFill>
+                <a:effectLst/>
+                <a:latin typeface="Courier New" pitchFamily="49" charset="0"/>
+                <a:cs typeface="Courier New" pitchFamily="49" charset="0"/>
+              </a:rPr>
+              <a:t>(</a:t>
+            </a:r>
+            <a:r>
+              <a:rPr kumimoji="0" lang="cs-CZ" altLang="cs-CZ" b="0" i="0" u="none" strike="noStrike" cap="none" normalizeH="0" baseline="0" dirty="0" err="1" smtClean="0">
+                <a:ln>
+                  <a:noFill/>
+                </a:ln>
+                <a:solidFill>
+                  <a:srgbClr val="000000"/>
+                </a:solidFill>
+                <a:effectLst/>
+                <a:latin typeface="Courier New" pitchFamily="49" charset="0"/>
+                <a:cs typeface="Courier New" pitchFamily="49" charset="0"/>
+              </a:rPr>
+              <a:t>fileName</a:t>
+            </a:r>
+            <a:r>
+              <a:rPr kumimoji="0" lang="cs-CZ" altLang="cs-CZ" b="0" i="0" u="none" strike="noStrike" cap="none" normalizeH="0" baseline="0" dirty="0" smtClean="0">
+                <a:ln>
+                  <a:noFill/>
+                </a:ln>
+                <a:solidFill>
+                  <a:srgbClr val="000000"/>
+                </a:solidFill>
+                <a:effectLst/>
+                <a:latin typeface="Courier New" pitchFamily="49" charset="0"/>
+                <a:cs typeface="Courier New" pitchFamily="49" charset="0"/>
+              </a:rPr>
+              <a:t>)</a:t>
+            </a:r>
+            <a:br>
+              <a:rPr kumimoji="0" lang="cs-CZ" altLang="cs-CZ" b="0" i="0" u="none" strike="noStrike" cap="none" normalizeH="0" baseline="0" dirty="0" smtClean="0">
+                <a:ln>
+                  <a:noFill/>
+                </a:ln>
+                <a:solidFill>
+                  <a:srgbClr val="000000"/>
+                </a:solidFill>
+                <a:effectLst/>
+                <a:latin typeface="Courier New" pitchFamily="49" charset="0"/>
+                <a:cs typeface="Courier New" pitchFamily="49" charset="0"/>
+              </a:rPr>
+            </a:br>
+            <a:r>
+              <a:rPr kumimoji="0" lang="cs-CZ" altLang="cs-CZ" b="0" i="0" u="none" strike="noStrike" cap="none" normalizeH="0" baseline="0" dirty="0" smtClean="0">
+                <a:ln>
+                  <a:noFill/>
+                </a:ln>
+                <a:solidFill>
+                  <a:srgbClr val="000000"/>
+                </a:solidFill>
+                <a:effectLst/>
+                <a:latin typeface="Courier New" pitchFamily="49" charset="0"/>
+                <a:cs typeface="Courier New" pitchFamily="49" charset="0"/>
+              </a:rPr>
+              <a:t>        .</a:t>
+            </a:r>
+            <a:r>
+              <a:rPr kumimoji="0" lang="cs-CZ" altLang="cs-CZ" b="0" i="1" u="none" strike="noStrike" cap="none" normalizeH="0" baseline="0" dirty="0" err="1" smtClean="0">
+                <a:ln>
+                  <a:noFill/>
+                </a:ln>
+                <a:solidFill>
+                  <a:srgbClr val="000000"/>
+                </a:solidFill>
+                <a:effectLst/>
+                <a:latin typeface="Courier New" pitchFamily="49" charset="0"/>
+                <a:cs typeface="Courier New" pitchFamily="49" charset="0"/>
+              </a:rPr>
+              <a:t>printWriter</a:t>
+            </a:r>
+            <a:r>
+              <a:rPr kumimoji="0" lang="cs-CZ" altLang="cs-CZ" b="0" i="0" u="none" strike="noStrike" cap="none" normalizeH="0" baseline="0" dirty="0" smtClean="0">
+                <a:ln>
+                  <a:noFill/>
+                </a:ln>
+                <a:solidFill>
+                  <a:srgbClr val="000000"/>
+                </a:solidFill>
+                <a:effectLst/>
+                <a:latin typeface="Courier New" pitchFamily="49" charset="0"/>
+                <a:cs typeface="Courier New" pitchFamily="49" charset="0"/>
+              </a:rPr>
+              <a:t>()</a:t>
+            </a:r>
+            <a:br>
+              <a:rPr kumimoji="0" lang="cs-CZ" altLang="cs-CZ" b="0" i="0" u="none" strike="noStrike" cap="none" normalizeH="0" baseline="0" dirty="0" smtClean="0">
+                <a:ln>
+                  <a:noFill/>
+                </a:ln>
+                <a:solidFill>
+                  <a:srgbClr val="000000"/>
+                </a:solidFill>
+                <a:effectLst/>
+                <a:latin typeface="Courier New" pitchFamily="49" charset="0"/>
+                <a:cs typeface="Courier New" pitchFamily="49" charset="0"/>
+              </a:rPr>
+            </a:br>
+            <a:r>
+              <a:rPr kumimoji="0" lang="cs-CZ" altLang="cs-CZ" b="0" i="0" u="none" strike="noStrike" cap="none" normalizeH="0" baseline="0" dirty="0" smtClean="0">
+                <a:ln>
+                  <a:noFill/>
+                </a:ln>
+                <a:solidFill>
+                  <a:srgbClr val="000000"/>
+                </a:solidFill>
+                <a:effectLst/>
+                <a:latin typeface="Courier New" pitchFamily="49" charset="0"/>
+                <a:cs typeface="Courier New" pitchFamily="49" charset="0"/>
+              </a:rPr>
+              <a:t>        .</a:t>
+            </a:r>
+            <a:r>
+              <a:rPr kumimoji="0" lang="cs-CZ" altLang="cs-CZ" b="1" i="1" u="none" strike="noStrike" cap="none" normalizeH="0" baseline="0" dirty="0" smtClean="0">
+                <a:ln>
+                  <a:noFill/>
+                </a:ln>
+                <a:solidFill>
+                  <a:srgbClr val="000000"/>
+                </a:solidFill>
+                <a:effectLst/>
+                <a:latin typeface="Courier New" pitchFamily="49" charset="0"/>
+                <a:cs typeface="Courier New" pitchFamily="49" charset="0"/>
+              </a:rPr>
+              <a:t>use</a:t>
+            </a:r>
+            <a:r>
+              <a:rPr kumimoji="0" lang="cs-CZ" altLang="cs-CZ" b="0" i="1" u="none" strike="noStrike" cap="none" normalizeH="0" baseline="0" dirty="0" smtClean="0">
+                <a:ln>
+                  <a:noFill/>
+                </a:ln>
+                <a:solidFill>
+                  <a:srgbClr val="000000"/>
+                </a:solidFill>
+                <a:effectLst/>
+                <a:latin typeface="Courier New" pitchFamily="49" charset="0"/>
+                <a:cs typeface="Courier New" pitchFamily="49" charset="0"/>
+              </a:rPr>
+              <a:t> </a:t>
+            </a:r>
+            <a:r>
+              <a:rPr kumimoji="0" lang="cs-CZ" altLang="cs-CZ" b="1" i="0" u="none" strike="noStrike" cap="none" normalizeH="0" baseline="0" dirty="0" smtClean="0">
+                <a:ln>
+                  <a:noFill/>
+                </a:ln>
+                <a:solidFill>
+                  <a:srgbClr val="000000"/>
+                </a:solidFill>
+                <a:effectLst/>
+                <a:latin typeface="Courier New" pitchFamily="49" charset="0"/>
+                <a:cs typeface="Courier New" pitchFamily="49" charset="0"/>
+              </a:rPr>
+              <a:t>{ </a:t>
+            </a:r>
+            <a:br>
+              <a:rPr kumimoji="0" lang="cs-CZ" altLang="cs-CZ" b="1" i="0" u="none" strike="noStrike" cap="none" normalizeH="0" baseline="0" dirty="0" smtClean="0">
+                <a:ln>
+                  <a:noFill/>
+                </a:ln>
+                <a:solidFill>
+                  <a:srgbClr val="000000"/>
+                </a:solidFill>
+                <a:effectLst/>
+                <a:latin typeface="Courier New" pitchFamily="49" charset="0"/>
+                <a:cs typeface="Courier New" pitchFamily="49" charset="0"/>
+              </a:rPr>
+            </a:br>
+            <a:r>
+              <a:rPr kumimoji="0" lang="cs-CZ" altLang="cs-CZ" b="1" i="0" u="none" strike="noStrike" cap="none" normalizeH="0" baseline="0" dirty="0" smtClean="0">
+                <a:ln>
+                  <a:noFill/>
+                </a:ln>
+                <a:solidFill>
+                  <a:srgbClr val="000000"/>
+                </a:solidFill>
+                <a:effectLst/>
+                <a:latin typeface="Courier New" pitchFamily="49" charset="0"/>
+                <a:cs typeface="Courier New" pitchFamily="49" charset="0"/>
+              </a:rPr>
+              <a:t>            </a:t>
+            </a:r>
+            <a:r>
+              <a:rPr kumimoji="0" lang="cs-CZ" altLang="cs-CZ" b="0" i="0" u="none" strike="noStrike" cap="none" normalizeH="0" baseline="0" dirty="0" err="1" smtClean="0">
+                <a:ln>
+                  <a:noFill/>
+                </a:ln>
+                <a:solidFill>
+                  <a:srgbClr val="000000"/>
+                </a:solidFill>
+                <a:effectLst/>
+                <a:latin typeface="Courier New" pitchFamily="49" charset="0"/>
+                <a:cs typeface="Courier New" pitchFamily="49" charset="0"/>
+              </a:rPr>
+              <a:t>out</a:t>
+            </a:r>
+            <a:r>
+              <a:rPr kumimoji="0" lang="cs-CZ" altLang="cs-CZ" b="0" i="0" u="none" strike="noStrike" cap="none" normalizeH="0" baseline="0" dirty="0" smtClean="0">
+                <a:ln>
+                  <a:noFill/>
+                </a:ln>
+                <a:solidFill>
+                  <a:srgbClr val="000000"/>
+                </a:solidFill>
+                <a:effectLst/>
+                <a:latin typeface="Courier New" pitchFamily="49" charset="0"/>
+                <a:cs typeface="Courier New" pitchFamily="49" charset="0"/>
+              </a:rPr>
+              <a:t> </a:t>
+            </a:r>
+            <a:r>
+              <a:rPr kumimoji="0" lang="cs-CZ" altLang="cs-CZ" b="1" i="0" u="none" strike="noStrike" cap="none" normalizeH="0" baseline="0" dirty="0" smtClean="0">
+                <a:ln>
+                  <a:noFill/>
+                </a:ln>
+                <a:solidFill>
+                  <a:srgbClr val="000000"/>
+                </a:solidFill>
+                <a:effectLst/>
+                <a:latin typeface="Courier New" pitchFamily="49" charset="0"/>
+                <a:cs typeface="Courier New" pitchFamily="49" charset="0"/>
+              </a:rPr>
+              <a:t>-&gt; </a:t>
+            </a:r>
+            <a:r>
+              <a:rPr kumimoji="0" lang="cs-CZ" altLang="cs-CZ" b="0" i="0" u="none" strike="noStrike" cap="none" normalizeH="0" baseline="0" dirty="0" err="1" smtClean="0">
+                <a:ln>
+                  <a:noFill/>
+                </a:ln>
+                <a:solidFill>
+                  <a:srgbClr val="000000"/>
+                </a:solidFill>
+                <a:effectLst/>
+                <a:latin typeface="Courier New" pitchFamily="49" charset="0"/>
+                <a:cs typeface="Courier New" pitchFamily="49" charset="0"/>
+              </a:rPr>
+              <a:t>out.println</a:t>
+            </a:r>
+            <a:r>
+              <a:rPr kumimoji="0" lang="cs-CZ" altLang="cs-CZ" b="0" i="0" u="none" strike="noStrike" cap="none" normalizeH="0" baseline="0" dirty="0" smtClean="0">
+                <a:ln>
+                  <a:noFill/>
+                </a:ln>
+                <a:solidFill>
+                  <a:srgbClr val="000000"/>
+                </a:solidFill>
+                <a:effectLst/>
+                <a:latin typeface="Courier New" pitchFamily="49" charset="0"/>
+                <a:cs typeface="Courier New" pitchFamily="49" charset="0"/>
+              </a:rPr>
+              <a:t>(</a:t>
+            </a:r>
+            <a:r>
+              <a:rPr kumimoji="0" lang="cs-CZ" altLang="cs-CZ" b="0" i="0" u="none" strike="noStrike" cap="none" normalizeH="0" baseline="0" dirty="0" err="1" smtClean="0">
+                <a:ln>
+                  <a:noFill/>
+                </a:ln>
+                <a:solidFill>
+                  <a:srgbClr val="000000"/>
+                </a:solidFill>
+                <a:effectLst/>
+                <a:latin typeface="Courier New" pitchFamily="49" charset="0"/>
+                <a:cs typeface="Courier New" pitchFamily="49" charset="0"/>
+              </a:rPr>
+              <a:t>fileContent</a:t>
+            </a:r>
+            <a:r>
+              <a:rPr kumimoji="0" lang="cs-CZ" altLang="cs-CZ" b="0" i="0" u="none" strike="noStrike" cap="none" normalizeH="0" baseline="0" dirty="0" smtClean="0">
+                <a:ln>
+                  <a:noFill/>
+                </a:ln>
+                <a:solidFill>
+                  <a:srgbClr val="000000"/>
+                </a:solidFill>
+                <a:effectLst/>
+                <a:latin typeface="Courier New" pitchFamily="49" charset="0"/>
+                <a:cs typeface="Courier New" pitchFamily="49" charset="0"/>
+              </a:rPr>
+              <a:t>) </a:t>
+            </a:r>
+            <a:br>
+              <a:rPr kumimoji="0" lang="cs-CZ" altLang="cs-CZ" b="0" i="0" u="none" strike="noStrike" cap="none" normalizeH="0" baseline="0" dirty="0" smtClean="0">
+                <a:ln>
+                  <a:noFill/>
+                </a:ln>
+                <a:solidFill>
+                  <a:srgbClr val="000000"/>
+                </a:solidFill>
+                <a:effectLst/>
+                <a:latin typeface="Courier New" pitchFamily="49" charset="0"/>
+                <a:cs typeface="Courier New" pitchFamily="49" charset="0"/>
+              </a:rPr>
+            </a:br>
+            <a:r>
+              <a:rPr kumimoji="0" lang="cs-CZ" altLang="cs-CZ" b="0" i="0" u="none" strike="noStrike" cap="none" normalizeH="0" baseline="0" dirty="0" smtClean="0">
+                <a:ln>
+                  <a:noFill/>
+                </a:ln>
+                <a:solidFill>
+                  <a:srgbClr val="000000"/>
+                </a:solidFill>
+                <a:effectLst/>
+                <a:latin typeface="Courier New" pitchFamily="49" charset="0"/>
+                <a:cs typeface="Courier New" pitchFamily="49" charset="0"/>
+              </a:rPr>
+              <a:t>        </a:t>
+            </a:r>
+            <a:r>
+              <a:rPr kumimoji="0" lang="cs-CZ" altLang="cs-CZ" b="1" i="0" u="none" strike="noStrike" cap="none" normalizeH="0" baseline="0" dirty="0" smtClean="0">
+                <a:ln>
+                  <a:noFill/>
+                </a:ln>
+                <a:solidFill>
+                  <a:srgbClr val="000000"/>
+                </a:solidFill>
+                <a:effectLst/>
+                <a:latin typeface="Courier New" pitchFamily="49" charset="0"/>
+                <a:cs typeface="Courier New" pitchFamily="49" charset="0"/>
+              </a:rPr>
+              <a:t>}</a:t>
+            </a:r>
+            <a:endParaRPr kumimoji="0" lang="cs-CZ" altLang="cs-CZ" b="0" i="0" u="none" strike="noStrike" cap="none" normalizeH="0" baseline="0" dirty="0" smtClean="0">
+              <a:ln>
+                <a:noFill/>
+              </a:ln>
+              <a:solidFill>
+                <a:schemeClr val="tx1"/>
+              </a:solidFill>
+              <a:effectLst/>
+              <a:latin typeface="Arial" pitchFamily="34" charset="0"/>
+              <a:cs typeface="Arial" pitchFamily="34" charset="0"/>
+            </a:endParaRPr>
+          </a:p>
+        </p:txBody>
+      </p:sp>
+    </p:spTree>
+    <p:extLst>
+      <p:ext uri="{BB962C8B-B14F-4D97-AF65-F5344CB8AC3E}">
+        <p14:creationId xmlns:p14="http://schemas.microsoft.com/office/powerpoint/2010/main" val="1368441094"/>
+      </p:ext>
+    </p:extLst>
+  </p:cSld>
+  <p:clrMapOvr>
+    <a:masterClrMapping/>
+  </p:clrMapOvr>
+  <p:timing>
+    <p:tnLst>
+      <p:par>
+        <p:cTn id="1" dur="indefinite" restart="never" nodeType="tmRoot"/>
+      </p:par>
+    </p:tnLst>
+  </p:timing>
+</p:sld>
+</file>
+
+<file path=ppt/slides/slide7.xml><?xml version="1.0" encoding="utf-8"?>
+<p:sld xmlns:a="http://schemas.openxmlformats.org/drawingml/2006/main" xmlns:r="http://schemas.openxmlformats.org/officeDocument/2006/relationships" xmlns:p="http://schemas.openxmlformats.org/presentationml/2006/main">
+  <p:cSld>
+    <p:spTree>
+      <p:nvGrpSpPr>
+        <p:cNvPr id="1" name=""/>
+        <p:cNvGrpSpPr/>
+        <p:nvPr/>
+      </p:nvGrpSpPr>
+      <p:grpSpPr>
+        <a:xfrm>
+          <a:off x="0" y="0"/>
+          <a:ext cx="0" cy="0"/>
+          <a:chOff x="0" y="0"/>
+          <a:chExt cx="0" cy="0"/>
+        </a:xfrm>
+      </p:grpSpPr>
+      <p:sp>
+        <p:nvSpPr>
+          <p:cNvPr id="2" name="Nadpis 1"/>
+          <p:cNvSpPr>
+            <a:spLocks noGrp="1"/>
+          </p:cNvSpPr>
+          <p:nvPr>
+            <p:ph type="title"/>
+          </p:nvPr>
+        </p:nvSpPr>
+        <p:spPr/>
+        <p:txBody>
+          <a:bodyPr/>
+          <a:lstStyle/>
+          <a:p>
+            <a:r>
+              <a:rPr lang="cs-CZ" dirty="0" err="1" smtClean="0"/>
+              <a:t>Measure</a:t>
+            </a:r>
+            <a:r>
+              <a:rPr lang="cs-CZ" dirty="0" smtClean="0"/>
+              <a:t> </a:t>
+            </a:r>
+            <a:r>
+              <a:rPr lang="cs-CZ" dirty="0" err="1" smtClean="0"/>
+              <a:t>Time</a:t>
+            </a:r>
+            <a:endParaRPr lang="cs-CZ" dirty="0"/>
+          </a:p>
+        </p:txBody>
+      </p:sp>
+      <p:sp>
+        <p:nvSpPr>
+          <p:cNvPr id="3" name="Zástupný symbol pro text 2"/>
+          <p:cNvSpPr>
+            <a:spLocks noGrp="1"/>
+          </p:cNvSpPr>
+          <p:nvPr>
+            <p:ph type="body" sz="quarter" idx="13"/>
+          </p:nvPr>
+        </p:nvSpPr>
+        <p:spPr>
+          <a:xfrm>
+            <a:off x="323528" y="1484783"/>
+            <a:ext cx="7560840" cy="4176465"/>
+          </a:xfrm>
+        </p:spPr>
+        <p:txBody>
+          <a:bodyPr/>
+          <a:lstStyle/>
+          <a:p>
+            <a:r>
+              <a:rPr lang="cs-CZ" dirty="0" err="1" smtClean="0"/>
+              <a:t>Timing.kt</a:t>
+            </a:r>
+            <a:endParaRPr lang="cs-CZ" dirty="0" smtClean="0"/>
+          </a:p>
+          <a:p>
+            <a:pPr lvl="1"/>
+            <a:r>
+              <a:rPr lang="cs-CZ" dirty="0" err="1" smtClean="0"/>
+              <a:t>measureTimeMillis</a:t>
+            </a:r>
+            <a:endParaRPr lang="cs-CZ" dirty="0" smtClean="0"/>
+          </a:p>
+          <a:p>
+            <a:pPr lvl="1"/>
+            <a:r>
+              <a:rPr lang="cs-CZ" dirty="0" err="1"/>
+              <a:t>measureNanoTime</a:t>
+            </a:r>
+            <a:endParaRPr lang="cs-CZ" dirty="0" smtClean="0"/>
+          </a:p>
+          <a:p>
+            <a:pPr marL="0" indent="0">
+              <a:buNone/>
+            </a:pPr>
+            <a:endParaRPr lang="cs-CZ" dirty="0"/>
+          </a:p>
+        </p:txBody>
+      </p:sp>
+      <p:sp>
+        <p:nvSpPr>
+          <p:cNvPr id="4" name="Rectangle 1"/>
+          <p:cNvSpPr>
+            <a:spLocks noChangeArrowheads="1"/>
+          </p:cNvSpPr>
+          <p:nvPr/>
+        </p:nvSpPr>
+        <p:spPr bwMode="auto">
+          <a:xfrm>
+            <a:off x="899592" y="3212976"/>
+            <a:ext cx="6660232" cy="1477328"/>
+          </a:xfrm>
+          <a:prstGeom prst="rect">
+            <a:avLst/>
+          </a:prstGeom>
+          <a:solidFill>
+            <a:srgbClr val="FFFFFF"/>
+          </a:solidFill>
+          <a:ln>
+            <a:noFill/>
+          </a:ln>
+          <a:effectLst/>
+          <a:extLst>
+            <a:ext uri="{91240B29-F687-4F45-9708-019B960494DF}">
+              <a14:hiddenLine xmlns:a14="http://schemas.microsoft.com/office/drawing/2010/main" w="9525">
+                <a:solidFill>
+                  <a:schemeClr val="tx1"/>
+                </a:solidFill>
+                <a:miter lim="800000"/>
+                <a:headEnd/>
+                <a:tailEnd/>
+              </a14:hiddenLine>
+            </a:ext>
+            <a:ext uri="{AF507438-7753-43E0-B8FC-AC1667EBCBE1}">
+              <a14:hiddenEffects xmlns:a14="http://schemas.microsoft.com/office/drawing/2010/main">
+                <a:effectLst>
+                  <a:outerShdw dist="35921" dir="2700000" algn="ctr" rotWithShape="0">
+                    <a:schemeClr val="bg2"/>
+                  </a:outerShdw>
+                </a:effectLst>
+              </a14:hiddenEffects>
+            </a:ext>
+          </a:extLst>
+        </p:spPr>
+        <p:txBody>
+          <a:bodyPr vert="horz" wrap="square" lIns="91440" tIns="45720" rIns="91440" bIns="45720" numCol="1" anchor="ctr" anchorCtr="0" compatLnSpc="1">
+            <a:prstTxWarp prst="textNoShape">
+              <a:avLst/>
+            </a:prstTxWarp>
+            <a:spAutoFit/>
+          </a:bodyPr>
+          <a:lstStyle/>
+          <a:p>
+            <a:pPr marL="0" marR="0" lvl="0" indent="0" algn="l" defTabSz="914400" rtl="0" eaLnBrk="1" fontAlgn="base" latinLnBrk="0" hangingPunct="1">
+              <a:lnSpc>
+                <a:spcPct val="100000"/>
+              </a:lnSpc>
+              <a:spcBef>
+                <a:spcPct val="0"/>
+              </a:spcBef>
+              <a:spcAft>
+                <a:spcPct val="0"/>
+              </a:spcAft>
+              <a:buClrTx/>
+              <a:buSzTx/>
+              <a:buFontTx/>
+              <a:buNone/>
+              <a:tabLst/>
+            </a:pPr>
+            <a:r>
+              <a:rPr kumimoji="0" lang="cs-CZ" altLang="cs-CZ" b="0" i="1" u="none" strike="noStrike" cap="none" normalizeH="0" baseline="0" dirty="0" err="1" smtClean="0">
+                <a:ln>
+                  <a:noFill/>
+                </a:ln>
+                <a:solidFill>
+                  <a:srgbClr val="000000"/>
+                </a:solidFill>
+                <a:effectLst/>
+                <a:latin typeface="Courier New" pitchFamily="49" charset="0"/>
+                <a:cs typeface="Courier New" pitchFamily="49" charset="0"/>
+              </a:rPr>
+              <a:t>measureTimeMillis</a:t>
+            </a:r>
+            <a:r>
+              <a:rPr kumimoji="0" lang="cs-CZ" altLang="cs-CZ" b="0" i="1" u="none" strike="noStrike" cap="none" normalizeH="0" baseline="0" dirty="0" smtClean="0">
+                <a:ln>
+                  <a:noFill/>
+                </a:ln>
+                <a:solidFill>
+                  <a:srgbClr val="000000"/>
+                </a:solidFill>
+                <a:effectLst/>
+                <a:latin typeface="Courier New" pitchFamily="49" charset="0"/>
+                <a:cs typeface="Courier New" pitchFamily="49" charset="0"/>
+              </a:rPr>
+              <a:t> </a:t>
+            </a:r>
+            <a:r>
+              <a:rPr kumimoji="0" lang="cs-CZ" altLang="cs-CZ" b="1" i="0" u="none" strike="noStrike" cap="none" normalizeH="0" baseline="0" dirty="0" smtClean="0">
+                <a:ln>
+                  <a:noFill/>
+                </a:ln>
+                <a:solidFill>
+                  <a:srgbClr val="000000"/>
+                </a:solidFill>
+                <a:effectLst/>
+                <a:latin typeface="Courier New" pitchFamily="49" charset="0"/>
+                <a:cs typeface="Courier New" pitchFamily="49" charset="0"/>
+              </a:rPr>
+              <a:t>{</a:t>
+            </a:r>
+            <a:br>
+              <a:rPr kumimoji="0" lang="cs-CZ" altLang="cs-CZ" b="1" i="0" u="none" strike="noStrike" cap="none" normalizeH="0" baseline="0" dirty="0" smtClean="0">
+                <a:ln>
+                  <a:noFill/>
+                </a:ln>
+                <a:solidFill>
+                  <a:srgbClr val="000000"/>
+                </a:solidFill>
+                <a:effectLst/>
+                <a:latin typeface="Courier New" pitchFamily="49" charset="0"/>
+                <a:cs typeface="Courier New" pitchFamily="49" charset="0"/>
+              </a:rPr>
+            </a:br>
+            <a:r>
+              <a:rPr kumimoji="0" lang="cs-CZ" altLang="cs-CZ" b="1" i="0" u="none" strike="noStrike" cap="none" normalizeH="0" baseline="0" dirty="0" smtClean="0">
+                <a:ln>
+                  <a:noFill/>
+                </a:ln>
+                <a:solidFill>
+                  <a:srgbClr val="000000"/>
+                </a:solidFill>
+                <a:effectLst/>
+                <a:latin typeface="Courier New" pitchFamily="49" charset="0"/>
+                <a:cs typeface="Courier New" pitchFamily="49" charset="0"/>
+              </a:rPr>
+              <a:t>    </a:t>
+            </a:r>
+            <a:r>
+              <a:rPr kumimoji="0" lang="cs-CZ" altLang="cs-CZ" b="0" i="0" u="none" strike="noStrike" cap="none" normalizeH="0" baseline="0" dirty="0" err="1" smtClean="0">
+                <a:ln>
+                  <a:noFill/>
+                </a:ln>
+                <a:solidFill>
+                  <a:srgbClr val="000000"/>
+                </a:solidFill>
+                <a:effectLst/>
+                <a:latin typeface="Courier New" pitchFamily="49" charset="0"/>
+                <a:cs typeface="Courier New" pitchFamily="49" charset="0"/>
+              </a:rPr>
+              <a:t>Thread.sleep</a:t>
+            </a:r>
+            <a:r>
+              <a:rPr kumimoji="0" lang="cs-CZ" altLang="cs-CZ" b="0" i="0" u="none" strike="noStrike" cap="none" normalizeH="0" baseline="0" dirty="0" smtClean="0">
+                <a:ln>
+                  <a:noFill/>
+                </a:ln>
+                <a:solidFill>
+                  <a:srgbClr val="000000"/>
+                </a:solidFill>
+                <a:effectLst/>
+                <a:latin typeface="Courier New" pitchFamily="49" charset="0"/>
+                <a:cs typeface="Courier New" pitchFamily="49" charset="0"/>
+              </a:rPr>
+              <a:t>(</a:t>
+            </a:r>
+            <a:r>
+              <a:rPr kumimoji="0" lang="cs-CZ" altLang="cs-CZ" b="0" i="0" u="none" strike="noStrike" cap="none" normalizeH="0" baseline="0" dirty="0" smtClean="0">
+                <a:ln>
+                  <a:noFill/>
+                </a:ln>
+                <a:solidFill>
+                  <a:srgbClr val="0000FF"/>
+                </a:solidFill>
+                <a:effectLst/>
+                <a:latin typeface="Courier New" pitchFamily="49" charset="0"/>
+                <a:cs typeface="Courier New" pitchFamily="49" charset="0"/>
+              </a:rPr>
+              <a:t>100</a:t>
+            </a:r>
+            <a:r>
+              <a:rPr kumimoji="0" lang="cs-CZ" altLang="cs-CZ" b="0" i="0" u="none" strike="noStrike" cap="none" normalizeH="0" baseline="0" dirty="0" smtClean="0">
+                <a:ln>
+                  <a:noFill/>
+                </a:ln>
+                <a:solidFill>
+                  <a:srgbClr val="000000"/>
+                </a:solidFill>
+                <a:effectLst/>
+                <a:latin typeface="Courier New" pitchFamily="49" charset="0"/>
+                <a:cs typeface="Courier New" pitchFamily="49" charset="0"/>
+              </a:rPr>
+              <a:t>)</a:t>
+            </a:r>
+            <a:br>
+              <a:rPr kumimoji="0" lang="cs-CZ" altLang="cs-CZ" b="0" i="0" u="none" strike="noStrike" cap="none" normalizeH="0" baseline="0" dirty="0" smtClean="0">
+                <a:ln>
+                  <a:noFill/>
+                </a:ln>
+                <a:solidFill>
+                  <a:srgbClr val="000000"/>
+                </a:solidFill>
+                <a:effectLst/>
+                <a:latin typeface="Courier New" pitchFamily="49" charset="0"/>
+                <a:cs typeface="Courier New" pitchFamily="49" charset="0"/>
+              </a:rPr>
+            </a:br>
+            <a:r>
+              <a:rPr kumimoji="0" lang="cs-CZ" altLang="cs-CZ" b="1" i="0" u="none" strike="noStrike" cap="none" normalizeH="0" baseline="0" dirty="0" smtClean="0">
+                <a:ln>
+                  <a:noFill/>
+                </a:ln>
+                <a:solidFill>
+                  <a:srgbClr val="000000"/>
+                </a:solidFill>
+                <a:effectLst/>
+                <a:latin typeface="Courier New" pitchFamily="49" charset="0"/>
+                <a:cs typeface="Courier New" pitchFamily="49" charset="0"/>
+              </a:rPr>
+              <a:t>}</a:t>
+            </a:r>
+            <a:r>
+              <a:rPr kumimoji="0" lang="cs-CZ" altLang="cs-CZ" b="0" i="0" u="none" strike="noStrike" cap="none" normalizeH="0" baseline="0" dirty="0" smtClean="0">
+                <a:ln>
+                  <a:noFill/>
+                </a:ln>
+                <a:solidFill>
+                  <a:srgbClr val="000000"/>
+                </a:solidFill>
+                <a:effectLst/>
+                <a:latin typeface="Courier New" pitchFamily="49" charset="0"/>
+                <a:cs typeface="Courier New" pitchFamily="49" charset="0"/>
+              </a:rPr>
+              <a:t>.</a:t>
+            </a:r>
+            <a:r>
+              <a:rPr kumimoji="0" lang="cs-CZ" altLang="cs-CZ" b="0" i="1" u="none" strike="noStrike" cap="none" normalizeH="0" baseline="0" dirty="0" err="1" smtClean="0">
+                <a:ln>
+                  <a:noFill/>
+                </a:ln>
+                <a:solidFill>
+                  <a:srgbClr val="000000"/>
+                </a:solidFill>
+                <a:effectLst/>
+                <a:latin typeface="Courier New" pitchFamily="49" charset="0"/>
+                <a:cs typeface="Courier New" pitchFamily="49" charset="0"/>
+              </a:rPr>
+              <a:t>also</a:t>
+            </a:r>
+            <a:r>
+              <a:rPr kumimoji="0" lang="cs-CZ" altLang="cs-CZ" b="0" i="1" u="none" strike="noStrike" cap="none" normalizeH="0" baseline="0" dirty="0" smtClean="0">
+                <a:ln>
+                  <a:noFill/>
+                </a:ln>
+                <a:solidFill>
+                  <a:srgbClr val="000000"/>
+                </a:solidFill>
+                <a:effectLst/>
+                <a:latin typeface="Courier New" pitchFamily="49" charset="0"/>
+                <a:cs typeface="Courier New" pitchFamily="49" charset="0"/>
+              </a:rPr>
+              <a:t> </a:t>
+            </a:r>
+            <a:r>
+              <a:rPr kumimoji="0" lang="cs-CZ" altLang="cs-CZ" b="1" i="0" u="none" strike="noStrike" cap="none" normalizeH="0" baseline="0" dirty="0" smtClean="0">
+                <a:ln>
+                  <a:noFill/>
+                </a:ln>
+                <a:solidFill>
+                  <a:srgbClr val="000000"/>
+                </a:solidFill>
+                <a:effectLst/>
+                <a:latin typeface="Courier New" pitchFamily="49" charset="0"/>
+                <a:cs typeface="Courier New" pitchFamily="49" charset="0"/>
+              </a:rPr>
+              <a:t>{</a:t>
+            </a:r>
+            <a:br>
+              <a:rPr kumimoji="0" lang="cs-CZ" altLang="cs-CZ" b="1" i="0" u="none" strike="noStrike" cap="none" normalizeH="0" baseline="0" dirty="0" smtClean="0">
+                <a:ln>
+                  <a:noFill/>
+                </a:ln>
+                <a:solidFill>
+                  <a:srgbClr val="000000"/>
+                </a:solidFill>
+                <a:effectLst/>
+                <a:latin typeface="Courier New" pitchFamily="49" charset="0"/>
+                <a:cs typeface="Courier New" pitchFamily="49" charset="0"/>
+              </a:rPr>
+            </a:br>
+            <a:r>
+              <a:rPr kumimoji="0" lang="cs-CZ" altLang="cs-CZ" b="1" i="0" u="none" strike="noStrike" cap="none" normalizeH="0" baseline="0" dirty="0" smtClean="0">
+                <a:ln>
+                  <a:noFill/>
+                </a:ln>
+                <a:solidFill>
+                  <a:srgbClr val="000000"/>
+                </a:solidFill>
+                <a:effectLst/>
+                <a:latin typeface="Courier New" pitchFamily="49" charset="0"/>
+                <a:cs typeface="Courier New" pitchFamily="49" charset="0"/>
+              </a:rPr>
+              <a:t>    </a:t>
+            </a:r>
+            <a:r>
+              <a:rPr kumimoji="0" lang="cs-CZ" altLang="cs-CZ" b="0" i="1" u="none" strike="noStrike" cap="none" normalizeH="0" baseline="0" dirty="0" err="1" smtClean="0">
+                <a:ln>
+                  <a:noFill/>
+                </a:ln>
+                <a:solidFill>
+                  <a:srgbClr val="000000"/>
+                </a:solidFill>
+                <a:effectLst/>
+                <a:latin typeface="Courier New" pitchFamily="49" charset="0"/>
+                <a:cs typeface="Courier New" pitchFamily="49" charset="0"/>
+              </a:rPr>
+              <a:t>println</a:t>
+            </a:r>
+            <a:r>
+              <a:rPr kumimoji="0" lang="cs-CZ" altLang="cs-CZ" b="0" i="0" u="none" strike="noStrike" cap="none" normalizeH="0" baseline="0" dirty="0" smtClean="0">
+                <a:ln>
+                  <a:noFill/>
+                </a:ln>
+                <a:solidFill>
+                  <a:srgbClr val="000000"/>
+                </a:solidFill>
+                <a:effectLst/>
+                <a:latin typeface="Courier New" pitchFamily="49" charset="0"/>
+                <a:cs typeface="Courier New" pitchFamily="49" charset="0"/>
+              </a:rPr>
+              <a:t>(</a:t>
+            </a:r>
+            <a:r>
+              <a:rPr kumimoji="0" lang="cs-CZ" altLang="cs-CZ" b="1" i="0" u="none" strike="noStrike" cap="none" normalizeH="0" baseline="0" dirty="0" smtClean="0">
+                <a:ln>
+                  <a:noFill/>
+                </a:ln>
+                <a:solidFill>
+                  <a:srgbClr val="008000"/>
+                </a:solidFill>
+                <a:effectLst/>
+                <a:latin typeface="Courier New" pitchFamily="49" charset="0"/>
+                <a:cs typeface="Courier New" pitchFamily="49" charset="0"/>
+              </a:rPr>
+              <a:t>"Operace trvala </a:t>
+            </a:r>
+            <a:r>
+              <a:rPr kumimoji="0" lang="cs-CZ" altLang="cs-CZ" b="1" i="0" u="none" strike="noStrike" cap="none" normalizeH="0" baseline="0" dirty="0" smtClean="0">
+                <a:ln>
+                  <a:noFill/>
+                </a:ln>
+                <a:solidFill>
+                  <a:srgbClr val="000080"/>
+                </a:solidFill>
+                <a:effectLst/>
+                <a:latin typeface="Courier New" pitchFamily="49" charset="0"/>
+                <a:cs typeface="Courier New" pitchFamily="49" charset="0"/>
+              </a:rPr>
+              <a:t>$</a:t>
+            </a:r>
+            <a:r>
+              <a:rPr kumimoji="0" lang="cs-CZ" altLang="cs-CZ" b="1" i="0" u="none" strike="noStrike" cap="none" normalizeH="0" baseline="0" dirty="0" err="1" smtClean="0">
+                <a:ln>
+                  <a:noFill/>
+                </a:ln>
+                <a:solidFill>
+                  <a:srgbClr val="000000"/>
+                </a:solidFill>
+                <a:effectLst/>
+                <a:latin typeface="Courier New" pitchFamily="49" charset="0"/>
+                <a:cs typeface="Courier New" pitchFamily="49" charset="0"/>
+              </a:rPr>
+              <a:t>it</a:t>
+            </a:r>
+            <a:r>
+              <a:rPr kumimoji="0" lang="cs-CZ" altLang="cs-CZ" b="1" i="0" u="none" strike="noStrike" cap="none" normalizeH="0" baseline="0" dirty="0" smtClean="0">
+                <a:ln>
+                  <a:noFill/>
+                </a:ln>
+                <a:solidFill>
+                  <a:srgbClr val="008000"/>
+                </a:solidFill>
+                <a:effectLst/>
+                <a:latin typeface="Courier New" pitchFamily="49" charset="0"/>
+                <a:cs typeface="Courier New" pitchFamily="49" charset="0"/>
+              </a:rPr>
+              <a:t> </a:t>
+            </a:r>
+            <a:r>
+              <a:rPr kumimoji="0" lang="cs-CZ" altLang="cs-CZ" b="1" i="0" u="none" strike="noStrike" cap="none" normalizeH="0" baseline="0" dirty="0" err="1" smtClean="0">
+                <a:ln>
+                  <a:noFill/>
+                </a:ln>
+                <a:solidFill>
+                  <a:srgbClr val="008000"/>
+                </a:solidFill>
+                <a:effectLst/>
+                <a:latin typeface="Courier New" pitchFamily="49" charset="0"/>
+                <a:cs typeface="Courier New" pitchFamily="49" charset="0"/>
+              </a:rPr>
+              <a:t>ms</a:t>
+            </a:r>
+            <a:r>
+              <a:rPr kumimoji="0" lang="cs-CZ" altLang="cs-CZ" b="1" i="0" u="none" strike="noStrike" cap="none" normalizeH="0" baseline="0" dirty="0" smtClean="0">
+                <a:ln>
+                  <a:noFill/>
+                </a:ln>
+                <a:solidFill>
+                  <a:srgbClr val="008000"/>
+                </a:solidFill>
+                <a:effectLst/>
+                <a:latin typeface="Courier New" pitchFamily="49" charset="0"/>
+                <a:cs typeface="Courier New" pitchFamily="49" charset="0"/>
+              </a:rPr>
+              <a:t>."</a:t>
+            </a:r>
+            <a:r>
+              <a:rPr kumimoji="0" lang="cs-CZ" altLang="cs-CZ" b="0" i="0" u="none" strike="noStrike" cap="none" normalizeH="0" baseline="0" dirty="0" smtClean="0">
+                <a:ln>
+                  <a:noFill/>
+                </a:ln>
+                <a:solidFill>
+                  <a:srgbClr val="000000"/>
+                </a:solidFill>
+                <a:effectLst/>
+                <a:latin typeface="Courier New" pitchFamily="49" charset="0"/>
+                <a:cs typeface="Courier New" pitchFamily="49" charset="0"/>
+              </a:rPr>
+              <a:t>)</a:t>
+            </a:r>
+            <a:br>
+              <a:rPr kumimoji="0" lang="cs-CZ" altLang="cs-CZ" b="0" i="0" u="none" strike="noStrike" cap="none" normalizeH="0" baseline="0" dirty="0" smtClean="0">
+                <a:ln>
+                  <a:noFill/>
+                </a:ln>
+                <a:solidFill>
+                  <a:srgbClr val="000000"/>
+                </a:solidFill>
+                <a:effectLst/>
+                <a:latin typeface="Courier New" pitchFamily="49" charset="0"/>
+                <a:cs typeface="Courier New" pitchFamily="49" charset="0"/>
+              </a:rPr>
+            </a:br>
+            <a:r>
+              <a:rPr kumimoji="0" lang="cs-CZ" altLang="cs-CZ" b="1" i="0" u="none" strike="noStrike" cap="none" normalizeH="0" baseline="0" dirty="0" smtClean="0">
+                <a:ln>
+                  <a:noFill/>
+                </a:ln>
+                <a:solidFill>
+                  <a:srgbClr val="000000"/>
+                </a:solidFill>
+                <a:effectLst/>
+                <a:latin typeface="Courier New" pitchFamily="49" charset="0"/>
+                <a:cs typeface="Courier New" pitchFamily="49" charset="0"/>
+              </a:rPr>
+              <a:t>}</a:t>
+            </a:r>
+            <a:endParaRPr kumimoji="0" lang="cs-CZ" altLang="cs-CZ" b="0" i="0" u="none" strike="noStrike" cap="none" normalizeH="0" baseline="0" dirty="0" smtClean="0">
+              <a:ln>
+                <a:noFill/>
+              </a:ln>
+              <a:solidFill>
+                <a:schemeClr val="tx1"/>
+              </a:solidFill>
+              <a:effectLst/>
+              <a:latin typeface="Arial" pitchFamily="34" charset="0"/>
+              <a:cs typeface="Arial" pitchFamily="34" charset="0"/>
+            </a:endParaRPr>
+          </a:p>
+        </p:txBody>
+      </p:sp>
+    </p:spTree>
+    <p:extLst>
+      <p:ext uri="{BB962C8B-B14F-4D97-AF65-F5344CB8AC3E}">
+        <p14:creationId xmlns:p14="http://schemas.microsoft.com/office/powerpoint/2010/main" val="2134166913"/>
+      </p:ext>
+    </p:extLst>
+  </p:cSld>
+  <p:clrMapOvr>
+    <a:masterClrMapping/>
+  </p:clrMapOvr>
+  <p:timing>
+    <p:tnLst>
+      <p:par>
+        <p:cTn id="1" dur="indefinite" restart="never" nodeType="tmRoot"/>
+      </p:par>
+    </p:tnLst>
+  </p:timing>
+</p:sld>
+</file>
+
+<file path=ppt/slides/slide8.xml><?xml version="1.0" encoding="utf-8"?>
 <p:sld xmlns:a="http://schemas.openxmlformats.org/drawingml/2006/main" xmlns:r="http://schemas.openxmlformats.org/officeDocument/2006/relationships" xmlns:p="http://schemas.openxmlformats.org/presentationml/2006/main">
   <p:cSld>
     <p:spTree>
@@ -9872,7 +11193,7 @@
 </p:sld>
 </file>
 
-<file path=ppt/slides/slide7.xml><?xml version="1.0" encoding="utf-8"?>
+<file path=ppt/slides/slide9.xml><?xml version="1.0" encoding="utf-8"?>
 <p:sld xmlns:a="http://schemas.openxmlformats.org/drawingml/2006/main" xmlns:r="http://schemas.openxmlformats.org/officeDocument/2006/relationships" xmlns:p="http://schemas.openxmlformats.org/presentationml/2006/main">
   <p:cSld>
     <p:spTree>

</xml_diff>